<commit_message>
Finaliazed edits from Adam ch 1-4 and 6
</commit_message>
<xml_diff>
--- a/RawImageFiles/3-3-AOTFConfigurations.pptx
+++ b/RawImageFiles/3-3-AOTFConfigurations.pptx
@@ -304,7 +304,7 @@
           <a:p>
             <a:fld id="{B033C8DD-9AB1-4F04-B1BD-7AAB3A71C60C}" type="datetimeFigureOut">
               <a:rPr lang="en-CA" smtClean="0"/>
-              <a:t>12/02/2016</a:t>
+              <a:t>2016-08-08</a:t>
             </a:fld>
             <a:endParaRPr lang="en-CA"/>
           </a:p>
@@ -474,7 +474,7 @@
           <a:p>
             <a:fld id="{B033C8DD-9AB1-4F04-B1BD-7AAB3A71C60C}" type="datetimeFigureOut">
               <a:rPr lang="en-CA" smtClean="0"/>
-              <a:t>12/02/2016</a:t>
+              <a:t>2016-08-08</a:t>
             </a:fld>
             <a:endParaRPr lang="en-CA"/>
           </a:p>
@@ -654,7 +654,7 @@
           <a:p>
             <a:fld id="{B033C8DD-9AB1-4F04-B1BD-7AAB3A71C60C}" type="datetimeFigureOut">
               <a:rPr lang="en-CA" smtClean="0"/>
-              <a:t>12/02/2016</a:t>
+              <a:t>2016-08-08</a:t>
             </a:fld>
             <a:endParaRPr lang="en-CA"/>
           </a:p>
@@ -824,7 +824,7 @@
           <a:p>
             <a:fld id="{B033C8DD-9AB1-4F04-B1BD-7AAB3A71C60C}" type="datetimeFigureOut">
               <a:rPr lang="en-CA" smtClean="0"/>
-              <a:t>12/02/2016</a:t>
+              <a:t>2016-08-08</a:t>
             </a:fld>
             <a:endParaRPr lang="en-CA"/>
           </a:p>
@@ -1070,7 +1070,7 @@
           <a:p>
             <a:fld id="{B033C8DD-9AB1-4F04-B1BD-7AAB3A71C60C}" type="datetimeFigureOut">
               <a:rPr lang="en-CA" smtClean="0"/>
-              <a:t>12/02/2016</a:t>
+              <a:t>2016-08-08</a:t>
             </a:fld>
             <a:endParaRPr lang="en-CA"/>
           </a:p>
@@ -1358,7 +1358,7 @@
           <a:p>
             <a:fld id="{B033C8DD-9AB1-4F04-B1BD-7AAB3A71C60C}" type="datetimeFigureOut">
               <a:rPr lang="en-CA" smtClean="0"/>
-              <a:t>12/02/2016</a:t>
+              <a:t>2016-08-08</a:t>
             </a:fld>
             <a:endParaRPr lang="en-CA"/>
           </a:p>
@@ -1785,7 +1785,7 @@
           <a:p>
             <a:fld id="{B033C8DD-9AB1-4F04-B1BD-7AAB3A71C60C}" type="datetimeFigureOut">
               <a:rPr lang="en-CA" smtClean="0"/>
-              <a:t>12/02/2016</a:t>
+              <a:t>2016-08-08</a:t>
             </a:fld>
             <a:endParaRPr lang="en-CA"/>
           </a:p>
@@ -1903,7 +1903,7 @@
           <a:p>
             <a:fld id="{B033C8DD-9AB1-4F04-B1BD-7AAB3A71C60C}" type="datetimeFigureOut">
               <a:rPr lang="en-CA" smtClean="0"/>
-              <a:t>12/02/2016</a:t>
+              <a:t>2016-08-08</a:t>
             </a:fld>
             <a:endParaRPr lang="en-CA"/>
           </a:p>
@@ -1998,7 +1998,7 @@
           <a:p>
             <a:fld id="{B033C8DD-9AB1-4F04-B1BD-7AAB3A71C60C}" type="datetimeFigureOut">
               <a:rPr lang="en-CA" smtClean="0"/>
-              <a:t>12/02/2016</a:t>
+              <a:t>2016-08-08</a:t>
             </a:fld>
             <a:endParaRPr lang="en-CA"/>
           </a:p>
@@ -2275,7 +2275,7 @@
           <a:p>
             <a:fld id="{B033C8DD-9AB1-4F04-B1BD-7AAB3A71C60C}" type="datetimeFigureOut">
               <a:rPr lang="en-CA" smtClean="0"/>
-              <a:t>12/02/2016</a:t>
+              <a:t>2016-08-08</a:t>
             </a:fld>
             <a:endParaRPr lang="en-CA"/>
           </a:p>
@@ -2528,7 +2528,7 @@
           <a:p>
             <a:fld id="{B033C8DD-9AB1-4F04-B1BD-7AAB3A71C60C}" type="datetimeFigureOut">
               <a:rPr lang="en-CA" smtClean="0"/>
-              <a:t>12/02/2016</a:t>
+              <a:t>2016-08-08</a:t>
             </a:fld>
             <a:endParaRPr lang="en-CA"/>
           </a:p>
@@ -2741,7 +2741,7 @@
           <a:p>
             <a:fld id="{B033C8DD-9AB1-4F04-B1BD-7AAB3A71C60C}" type="datetimeFigureOut">
               <a:rPr lang="en-CA" smtClean="0"/>
-              <a:t>12/02/2016</a:t>
+              <a:t>2016-08-08</a:t>
             </a:fld>
             <a:endParaRPr lang="en-CA"/>
           </a:p>
@@ -3167,7 +3167,7 @@
         </p:nvSpPr>
         <p:spPr>
           <a:xfrm>
-            <a:off x="840589" y="1845852"/>
+            <a:off x="815189" y="1845852"/>
             <a:ext cx="84145" cy="1128528"/>
           </a:xfrm>
           <a:prstGeom prst="roundRect">
@@ -3443,7 +3443,7 @@
           <a:prstGeom prst="line">
             <a:avLst/>
           </a:prstGeom>
-          <a:ln>
+          <a:ln w="19050">
             <a:solidFill>
               <a:schemeClr val="tx1"/>
             </a:solidFill>
@@ -3478,7 +3478,7 @@
           <a:prstGeom prst="straightConnector1">
             <a:avLst/>
           </a:prstGeom>
-          <a:ln>
+          <a:ln w="19050">
             <a:headEnd type="none" w="med" len="med"/>
             <a:tailEnd type="none" w="med" len="med"/>
           </a:ln>
@@ -3514,7 +3514,7 @@
           <a:prstGeom prst="line">
             <a:avLst/>
           </a:prstGeom>
-          <a:ln>
+          <a:ln w="19050">
             <a:solidFill>
               <a:schemeClr val="tx1"/>
             </a:solidFill>
@@ -3549,7 +3549,7 @@
           <a:prstGeom prst="straightConnector1">
             <a:avLst/>
           </a:prstGeom>
-          <a:ln>
+          <a:ln w="19050">
             <a:tailEnd type="triangle"/>
           </a:ln>
         </p:spPr>
@@ -3582,7 +3582,7 @@
           <a:prstGeom prst="line">
             <a:avLst/>
           </a:prstGeom>
-          <a:ln>
+          <a:ln w="19050">
             <a:solidFill>
               <a:schemeClr val="tx1"/>
             </a:solidFill>
@@ -3617,7 +3617,7 @@
           <a:prstGeom prst="straightConnector1">
             <a:avLst/>
           </a:prstGeom>
-          <a:ln>
+          <a:ln w="19050">
             <a:solidFill>
               <a:schemeClr val="tx1"/>
             </a:solidFill>
@@ -3653,6 +3653,7 @@
           <a:prstGeom prst="line">
             <a:avLst/>
           </a:prstGeom>
+          <a:ln w="19050"/>
         </p:spPr>
         <p:style>
           <a:lnRef idx="1">
@@ -3685,7 +3686,7 @@
           <a:prstGeom prst="line">
             <a:avLst/>
           </a:prstGeom>
-          <a:ln>
+          <a:ln w="19050">
             <a:solidFill>
               <a:schemeClr val="tx1"/>
             </a:solidFill>
@@ -3720,6 +3721,7 @@
           <a:prstGeom prst="line">
             <a:avLst/>
           </a:prstGeom>
+          <a:ln w="19050"/>
         </p:spPr>
         <p:style>
           <a:lnRef idx="1">
@@ -3744,13 +3746,13 @@
         </p:nvCxnSpPr>
         <p:spPr>
           <a:xfrm flipV="1">
-            <a:off x="2701215" y="198637"/>
+            <a:off x="2701215" y="194671"/>
             <a:ext cx="225842" cy="88213"/>
           </a:xfrm>
           <a:prstGeom prst="straightConnector1">
             <a:avLst/>
           </a:prstGeom>
-          <a:ln>
+          <a:ln w="19050">
             <a:tailEnd type="triangle"/>
           </a:ln>
         </p:spPr>
@@ -3783,7 +3785,7 @@
           <a:prstGeom prst="line">
             <a:avLst/>
           </a:prstGeom>
-          <a:ln>
+          <a:ln w="19050">
             <a:solidFill>
               <a:schemeClr val="tx1"/>
             </a:solidFill>
@@ -3844,7 +3846,7 @@
         </p:nvSpPr>
         <p:spPr>
           <a:xfrm>
-            <a:off x="2618267" y="1845852"/>
+            <a:off x="2592867" y="1845852"/>
             <a:ext cx="84145" cy="1128530"/>
           </a:xfrm>
           <a:prstGeom prst="roundRect">
@@ -3887,7 +3889,7 @@
         </p:nvSpPr>
         <p:spPr>
           <a:xfrm>
-            <a:off x="945537" y="1885991"/>
+            <a:off x="920137" y="1885991"/>
             <a:ext cx="1656184" cy="1008112"/>
           </a:xfrm>
           <a:prstGeom prst="parallelogram">
@@ -3925,7 +3927,7 @@
         </p:nvSpPr>
         <p:spPr>
           <a:xfrm rot="720013">
-            <a:off x="1685774" y="1991603"/>
+            <a:off x="1660374" y="1991603"/>
             <a:ext cx="252815" cy="864096"/>
           </a:xfrm>
           <a:prstGeom prst="upArrow">
@@ -4117,13 +4119,13 @@
         </p:nvCxnSpPr>
         <p:spPr>
           <a:xfrm flipH="1">
-            <a:off x="189713" y="2390047"/>
+            <a:off x="164313" y="2390047"/>
             <a:ext cx="881838" cy="0"/>
           </a:xfrm>
           <a:prstGeom prst="line">
             <a:avLst/>
           </a:prstGeom>
-          <a:ln>
+          <a:ln w="19050">
             <a:solidFill>
               <a:schemeClr val="tx1"/>
             </a:solidFill>
@@ -4152,13 +4154,13 @@
         </p:nvCxnSpPr>
         <p:spPr>
           <a:xfrm>
-            <a:off x="1796485" y="2452692"/>
+            <a:off x="1771085" y="2452692"/>
             <a:ext cx="601827" cy="199974"/>
           </a:xfrm>
           <a:prstGeom prst="straightConnector1">
             <a:avLst/>
           </a:prstGeom>
-          <a:ln>
+          <a:ln w="19050">
             <a:headEnd type="none" w="med" len="med"/>
             <a:tailEnd type="none" w="med" len="med"/>
           </a:ln>
@@ -4188,13 +4190,13 @@
         </p:nvCxnSpPr>
         <p:spPr>
           <a:xfrm>
-            <a:off x="1071551" y="2390047"/>
+            <a:off x="1046151" y="2390047"/>
             <a:ext cx="1372739" cy="119541"/>
           </a:xfrm>
           <a:prstGeom prst="line">
             <a:avLst/>
           </a:prstGeom>
-          <a:ln>
+          <a:ln w="19050">
             <a:solidFill>
               <a:schemeClr val="tx1"/>
             </a:solidFill>
@@ -4223,13 +4225,13 @@
         </p:nvCxnSpPr>
         <p:spPr>
           <a:xfrm>
-            <a:off x="2395630" y="2652666"/>
+            <a:off x="2370230" y="2652666"/>
             <a:ext cx="480757" cy="267894"/>
           </a:xfrm>
           <a:prstGeom prst="straightConnector1">
             <a:avLst/>
           </a:prstGeom>
-          <a:ln>
+          <a:ln w="19050">
             <a:tailEnd type="triangle"/>
           </a:ln>
         </p:spPr>
@@ -4256,13 +4258,13 @@
         </p:nvCxnSpPr>
         <p:spPr>
           <a:xfrm>
-            <a:off x="2444323" y="2509588"/>
+            <a:off x="2418923" y="2509588"/>
             <a:ext cx="255407" cy="62800"/>
           </a:xfrm>
           <a:prstGeom prst="line">
             <a:avLst/>
           </a:prstGeom>
-          <a:ln>
+          <a:ln w="19050">
             <a:solidFill>
               <a:schemeClr val="tx1"/>
             </a:solidFill>
@@ -4291,13 +4293,13 @@
         </p:nvCxnSpPr>
         <p:spPr>
           <a:xfrm>
-            <a:off x="2711436" y="2574552"/>
+            <a:off x="2686036" y="2574552"/>
             <a:ext cx="238166" cy="78114"/>
           </a:xfrm>
           <a:prstGeom prst="straightConnector1">
             <a:avLst/>
           </a:prstGeom>
-          <a:ln>
+          <a:ln w="19050">
             <a:solidFill>
               <a:schemeClr val="tx1"/>
             </a:solidFill>
@@ -4334,7 +4336,7 @@
           <a:prstGeom prst="line">
             <a:avLst/>
           </a:prstGeom>
-          <a:ln>
+          <a:ln w="19050">
             <a:prstDash val="sysDot"/>
           </a:ln>
         </p:spPr>
@@ -4363,13 +4365,13 @@
         </p:nvCxnSpPr>
         <p:spPr>
           <a:xfrm flipV="1">
-            <a:off x="1071551" y="2283916"/>
+            <a:off x="1046151" y="2283916"/>
             <a:ext cx="1421972" cy="106131"/>
           </a:xfrm>
           <a:prstGeom prst="line">
             <a:avLst/>
           </a:prstGeom>
-          <a:ln>
+          <a:ln w="19050">
             <a:solidFill>
               <a:schemeClr val="tx1"/>
             </a:solidFill>
@@ -4399,14 +4401,14 @@
         </p:nvCxnSpPr>
         <p:spPr>
           <a:xfrm flipV="1">
-            <a:off x="2516041" y="2089895"/>
+            <a:off x="2490641" y="2089895"/>
             <a:ext cx="183688" cy="80277"/>
           </a:xfrm>
           <a:prstGeom prst="line">
             <a:avLst/>
           </a:prstGeom>
-          <a:ln>
-            <a:prstDash val="sysDash"/>
+          <a:ln w="19050">
+            <a:prstDash val="sysDot"/>
           </a:ln>
         </p:spPr>
         <p:style>
@@ -4432,13 +4434,13 @@
         </p:nvCxnSpPr>
         <p:spPr>
           <a:xfrm flipV="1">
-            <a:off x="2699729" y="2001683"/>
+            <a:off x="2674329" y="2001683"/>
             <a:ext cx="225842" cy="88213"/>
           </a:xfrm>
           <a:prstGeom prst="straightConnector1">
             <a:avLst/>
           </a:prstGeom>
-          <a:ln>
+          <a:ln w="19050">
             <a:prstDash val="sysDot"/>
             <a:tailEnd type="triangle"/>
           </a:ln>
@@ -4472,7 +4474,7 @@
           <a:prstGeom prst="line">
             <a:avLst/>
           </a:prstGeom>
-          <a:ln>
+          <a:ln w="19050">
             <a:solidFill>
               <a:schemeClr val="tx1"/>
             </a:solidFill>
@@ -4631,11 +4633,7 @@
           <a:p>
             <a:r>
               <a:rPr lang="en-CA" smtClean="0"/>
-              <a:t>No </a:t>
-            </a:r>
-            <a:r>
-              <a:rPr lang="en-CA" smtClean="0"/>
-              <a:t>Acoustic Wave</a:t>
+              <a:t>No Acoustic Wave</a:t>
             </a:r>
             <a:endParaRPr lang="en-CA" dirty="0"/>
           </a:p>
@@ -4715,7 +4713,7 @@
           <a:prstGeom prst="line">
             <a:avLst/>
           </a:prstGeom>
-          <a:ln>
+          <a:ln w="19050">
             <a:solidFill>
               <a:schemeClr val="tx1"/>
             </a:solidFill>
@@ -4752,7 +4750,7 @@
           <a:prstGeom prst="line">
             <a:avLst/>
           </a:prstGeom>
-          <a:ln>
+          <a:ln w="19050">
             <a:solidFill>
               <a:schemeClr val="tx1"/>
             </a:solidFill>
@@ -4787,7 +4785,7 @@
           <a:prstGeom prst="line">
             <a:avLst/>
           </a:prstGeom>
-          <a:ln>
+          <a:ln w="19050">
             <a:solidFill>
               <a:schemeClr val="tx1"/>
             </a:solidFill>
@@ -4822,7 +4820,7 @@
           <a:prstGeom prst="straightConnector1">
             <a:avLst/>
           </a:prstGeom>
-          <a:ln>
+          <a:ln w="19050">
             <a:solidFill>
               <a:schemeClr val="tx1"/>
             </a:solidFill>
@@ -4861,7 +4859,7 @@
           <a:prstGeom prst="line">
             <a:avLst/>
           </a:prstGeom>
-          <a:ln>
+          <a:ln w="19050">
             <a:solidFill>
               <a:schemeClr val="tx1"/>
             </a:solidFill>
@@ -4897,7 +4895,7 @@
           <a:prstGeom prst="line">
             <a:avLst/>
           </a:prstGeom>
-          <a:ln>
+          <a:ln w="19050">
             <a:solidFill>
               <a:schemeClr val="tx1"/>
             </a:solidFill>

</xml_diff>